<commit_message>
IMPLEMENT: generate QASC reports (baseline + comparison)
</commit_message>
<xml_diff>
--- a/backgrounds/qasc_comparison.pptx
+++ b/backgrounds/qasc_comparison.pptx
@@ -204,7 +204,7 @@
           <a:p>
             <a:fld id="{E6A69615-254C-4920-85AE-6962735E8558}" type="datetimeFigureOut">
               <a:rPr lang="cs-CZ" smtClean="0"/>
-              <a:t>31.07.2020</a:t>
+              <a:t>04.08.2020</a:t>
             </a:fld>
             <a:endParaRPr lang="cs-CZ"/>
           </a:p>
@@ -370,7 +370,7 @@
           <a:p>
             <a:fld id="{E4CF3DBE-F708-43B4-99AB-207F49198DA3}" type="datetimeFigureOut">
               <a:rPr lang="en-GB" smtClean="0"/>
-              <a:t>31/07/2020</a:t>
+              <a:t>04/08/2020</a:t>
             </a:fld>
             <a:endParaRPr lang="en-GB"/>
           </a:p>
@@ -844,7 +844,7 @@
           <a:p>
             <a:fld id="{D88F835E-4AFD-4E74-8D50-E5D224003B6B}" type="datetime1">
               <a:rPr lang="en-CA" smtClean="0"/>
-              <a:t>2020-07-31</a:t>
+              <a:t>2020-08-04</a:t>
             </a:fld>
             <a:endParaRPr lang="en-CA"/>
           </a:p>
@@ -1064,7 +1064,7 @@
           <a:p>
             <a:fld id="{4186BF4A-3E2C-4CFE-80A4-B1635640837D}" type="datetime1">
               <a:rPr lang="en-CA" smtClean="0"/>
-              <a:t>2020-07-31</a:t>
+              <a:t>2020-08-04</a:t>
             </a:fld>
             <a:endParaRPr lang="en-CA"/>
           </a:p>
@@ -1610,7 +1610,7 @@
         </p:nvSpPr>
         <p:spPr>
           <a:xfrm>
-            <a:off x="7025544" y="886002"/>
+            <a:off x="7269766" y="886002"/>
             <a:ext cx="3241352" cy="1446550"/>
           </a:xfrm>
           <a:prstGeom prst="rect">
@@ -1683,7 +1683,7 @@
         </p:nvSpPr>
         <p:spPr>
           <a:xfrm>
-            <a:off x="7025544" y="2532111"/>
+            <a:off x="7269766" y="2532111"/>
             <a:ext cx="3241351" cy="2462213"/>
           </a:xfrm>
           <a:prstGeom prst="rect">
@@ -1777,7 +1777,7 @@
         </p:nvSpPr>
         <p:spPr>
           <a:xfrm>
-            <a:off x="7025543" y="5193883"/>
+            <a:off x="7269765" y="5193883"/>
             <a:ext cx="3241352" cy="1446550"/>
           </a:xfrm>
           <a:prstGeom prst="rect">
@@ -2014,7 +2014,7 @@
         </p:nvSpPr>
         <p:spPr>
           <a:xfrm>
-            <a:off x="5628388" y="3988391"/>
+            <a:off x="5736303" y="3683591"/>
             <a:ext cx="4638508" cy="938719"/>
           </a:xfrm>
           <a:prstGeom prst="rect">
@@ -2102,8 +2102,8 @@
         </p:nvSpPr>
         <p:spPr>
           <a:xfrm>
-            <a:off x="477079" y="6974264"/>
-            <a:ext cx="9672194" cy="461665"/>
+            <a:off x="216000" y="6974264"/>
+            <a:ext cx="10158811" cy="461665"/>
           </a:xfrm>
           <a:prstGeom prst="rect">
             <a:avLst/>
@@ -2705,7 +2705,7 @@
         </p:nvSpPr>
         <p:spPr>
           <a:xfrm>
-            <a:off x="5543196" y="4927110"/>
+            <a:off x="5651111" y="4736457"/>
             <a:ext cx="4723700" cy="938719"/>
           </a:xfrm>
           <a:prstGeom prst="rect">
@@ -2772,7 +2772,7 @@
         </p:nvSpPr>
         <p:spPr>
           <a:xfrm>
-            <a:off x="5543196" y="5789324"/>
+            <a:off x="5651111" y="5730373"/>
             <a:ext cx="4723701" cy="1184940"/>
           </a:xfrm>
           <a:prstGeom prst="rect">

</xml_diff>